<commit_message>
Interim checkin, amended battery display and got in test code for timer display
</commit_message>
<xml_diff>
--- a/Design/Design.pptx
+++ b/Design/Design.pptx
@@ -104,6 +104,11 @@
       </a:defRPr>
     </a:lvl9pPr>
   </p:defaultTextStyle>
+  <p:extLst>
+    <p:ext uri="{EFAFB233-063F-42B5-8137-9DF3F51BA10A}">
+      <p15:sldGuideLst xmlns:p15="http://schemas.microsoft.com/office/powerpoint/2012/main"/>
+    </p:ext>
+  </p:extLst>
 </p:presentation>
 </file>
 
@@ -254,7 +259,7 @@
           <a:p>
             <a:fld id="{D8774586-24DE-4023-9D0F-653DEE581528}" type="datetimeFigureOut">
               <a:rPr lang="en-US" smtClean="0"/>
-              <a:t>12/11/2020</a:t>
+              <a:t>12/13/2020</a:t>
             </a:fld>
             <a:endParaRPr lang="en-US"/>
           </a:p>
@@ -452,7 +457,7 @@
           <a:p>
             <a:fld id="{D8774586-24DE-4023-9D0F-653DEE581528}" type="datetimeFigureOut">
               <a:rPr lang="en-US" smtClean="0"/>
-              <a:t>12/11/2020</a:t>
+              <a:t>12/13/2020</a:t>
             </a:fld>
             <a:endParaRPr lang="en-US"/>
           </a:p>
@@ -660,7 +665,7 @@
           <a:p>
             <a:fld id="{D8774586-24DE-4023-9D0F-653DEE581528}" type="datetimeFigureOut">
               <a:rPr lang="en-US" smtClean="0"/>
-              <a:t>12/11/2020</a:t>
+              <a:t>12/13/2020</a:t>
             </a:fld>
             <a:endParaRPr lang="en-US"/>
           </a:p>
@@ -858,7 +863,7 @@
           <a:p>
             <a:fld id="{D8774586-24DE-4023-9D0F-653DEE581528}" type="datetimeFigureOut">
               <a:rPr lang="en-US" smtClean="0"/>
-              <a:t>12/11/2020</a:t>
+              <a:t>12/13/2020</a:t>
             </a:fld>
             <a:endParaRPr lang="en-US"/>
           </a:p>
@@ -1133,7 +1138,7 @@
           <a:p>
             <a:fld id="{D8774586-24DE-4023-9D0F-653DEE581528}" type="datetimeFigureOut">
               <a:rPr lang="en-US" smtClean="0"/>
-              <a:t>12/11/2020</a:t>
+              <a:t>12/13/2020</a:t>
             </a:fld>
             <a:endParaRPr lang="en-US"/>
           </a:p>
@@ -1398,7 +1403,7 @@
           <a:p>
             <a:fld id="{D8774586-24DE-4023-9D0F-653DEE581528}" type="datetimeFigureOut">
               <a:rPr lang="en-US" smtClean="0"/>
-              <a:t>12/11/2020</a:t>
+              <a:t>12/13/2020</a:t>
             </a:fld>
             <a:endParaRPr lang="en-US"/>
           </a:p>
@@ -1810,7 +1815,7 @@
           <a:p>
             <a:fld id="{D8774586-24DE-4023-9D0F-653DEE581528}" type="datetimeFigureOut">
               <a:rPr lang="en-US" smtClean="0"/>
-              <a:t>12/11/2020</a:t>
+              <a:t>12/13/2020</a:t>
             </a:fld>
             <a:endParaRPr lang="en-US"/>
           </a:p>
@@ -1951,7 +1956,7 @@
           <a:p>
             <a:fld id="{D8774586-24DE-4023-9D0F-653DEE581528}" type="datetimeFigureOut">
               <a:rPr lang="en-US" smtClean="0"/>
-              <a:t>12/11/2020</a:t>
+              <a:t>12/13/2020</a:t>
             </a:fld>
             <a:endParaRPr lang="en-US"/>
           </a:p>
@@ -2064,7 +2069,7 @@
           <a:p>
             <a:fld id="{D8774586-24DE-4023-9D0F-653DEE581528}" type="datetimeFigureOut">
               <a:rPr lang="en-US" smtClean="0"/>
-              <a:t>12/11/2020</a:t>
+              <a:t>12/13/2020</a:t>
             </a:fld>
             <a:endParaRPr lang="en-US"/>
           </a:p>
@@ -2375,7 +2380,7 @@
           <a:p>
             <a:fld id="{D8774586-24DE-4023-9D0F-653DEE581528}" type="datetimeFigureOut">
               <a:rPr lang="en-US" smtClean="0"/>
-              <a:t>12/11/2020</a:t>
+              <a:t>12/13/2020</a:t>
             </a:fld>
             <a:endParaRPr lang="en-US"/>
           </a:p>
@@ -2663,7 +2668,7 @@
           <a:p>
             <a:fld id="{D8774586-24DE-4023-9D0F-653DEE581528}" type="datetimeFigureOut">
               <a:rPr lang="en-US" smtClean="0"/>
-              <a:t>12/11/2020</a:t>
+              <a:t>12/13/2020</a:t>
             </a:fld>
             <a:endParaRPr lang="en-US"/>
           </a:p>
@@ -2904,7 +2909,7 @@
           <a:p>
             <a:fld id="{D8774586-24DE-4023-9D0F-653DEE581528}" type="datetimeFigureOut">
               <a:rPr lang="en-US" smtClean="0"/>
-              <a:t>12/11/2020</a:t>
+              <a:t>12/13/2020</a:t>
             </a:fld>
             <a:endParaRPr lang="en-US"/>
           </a:p>
@@ -4166,12 +4171,204 @@
           <a:p>
             <a:r>
               <a:rPr lang="en-GB" dirty="0"/>
-              <a:t>*Icons used aren’t the once from PowerPoint.</a:t>
+              <a:t>*Icons used aren’t the ones from PowerPoint.</a:t>
             </a:r>
             <a:endParaRPr lang="en-US" dirty="0"/>
           </a:p>
         </p:txBody>
       </p:sp>
+      <p:pic>
+        <p:nvPicPr>
+          <p:cNvPr id="3" name="Graphic 2" descr="Shoe footprints with solid fill">
+            <a:extLst>
+              <a:ext uri="{FF2B5EF4-FFF2-40B4-BE49-F238E27FC236}">
+                <a16:creationId xmlns:a16="http://schemas.microsoft.com/office/drawing/2014/main" id="{D2B8A69C-F3E3-4EAB-A182-D998AEC5918E}"/>
+              </a:ext>
+            </a:extLst>
+          </p:cNvPr>
+          <p:cNvPicPr>
+            <a:picLocks noChangeAspect="1"/>
+          </p:cNvPicPr>
+          <p:nvPr/>
+        </p:nvPicPr>
+        <p:blipFill>
+          <a:blip r:embed="rId25">
+            <a:extLst>
+              <a:ext uri="{28A0092B-C50C-407E-A947-70E740481C1C}">
+                <a14:useLocalDpi xmlns:a14="http://schemas.microsoft.com/office/drawing/2010/main" val="0"/>
+              </a:ext>
+              <a:ext uri="{96DAC541-7B7A-43D3-8B79-37D633B846F1}">
+                <asvg:svgBlip xmlns:asvg="http://schemas.microsoft.com/office/drawing/2016/SVG/main" r:embed="rId26"/>
+              </a:ext>
+            </a:extLst>
+          </a:blip>
+          <a:stretch>
+            <a:fillRect/>
+          </a:stretch>
+        </p:blipFill>
+        <p:spPr>
+          <a:xfrm>
+            <a:off x="9747209" y="930323"/>
+            <a:ext cx="230400" cy="230400"/>
+          </a:xfrm>
+          <a:prstGeom prst="rect">
+            <a:avLst/>
+          </a:prstGeom>
+        </p:spPr>
+      </p:pic>
+      <p:pic>
+        <p:nvPicPr>
+          <p:cNvPr id="7" name="Graphic 6" descr="Fire with solid fill">
+            <a:extLst>
+              <a:ext uri="{FF2B5EF4-FFF2-40B4-BE49-F238E27FC236}">
+                <a16:creationId xmlns:a16="http://schemas.microsoft.com/office/drawing/2014/main" id="{89238D41-49B1-4FA8-AC7E-C37EC8ECD2F9}"/>
+              </a:ext>
+            </a:extLst>
+          </p:cNvPr>
+          <p:cNvPicPr>
+            <a:picLocks noChangeAspect="1"/>
+          </p:cNvPicPr>
+          <p:nvPr/>
+        </p:nvPicPr>
+        <p:blipFill>
+          <a:blip r:embed="rId27">
+            <a:extLst>
+              <a:ext uri="{28A0092B-C50C-407E-A947-70E740481C1C}">
+                <a14:useLocalDpi xmlns:a14="http://schemas.microsoft.com/office/drawing/2010/main" val="0"/>
+              </a:ext>
+              <a:ext uri="{96DAC541-7B7A-43D3-8B79-37D633B846F1}">
+                <asvg:svgBlip xmlns:asvg="http://schemas.microsoft.com/office/drawing/2016/SVG/main" r:embed="rId28"/>
+              </a:ext>
+            </a:extLst>
+          </a:blip>
+          <a:stretch>
+            <a:fillRect/>
+          </a:stretch>
+        </p:blipFill>
+        <p:spPr>
+          <a:xfrm>
+            <a:off x="10524542" y="930323"/>
+            <a:ext cx="230400" cy="230400"/>
+          </a:xfrm>
+          <a:prstGeom prst="rect">
+            <a:avLst/>
+          </a:prstGeom>
+        </p:spPr>
+      </p:pic>
+      <p:sp>
+        <p:nvSpPr>
+          <p:cNvPr id="28" name="TextBox 27">
+            <a:extLst>
+              <a:ext uri="{FF2B5EF4-FFF2-40B4-BE49-F238E27FC236}">
+                <a16:creationId xmlns:a16="http://schemas.microsoft.com/office/drawing/2014/main" id="{B15BCB2F-5A50-4852-ADB6-C732787A766D}"/>
+              </a:ext>
+            </a:extLst>
+          </p:cNvPr>
+          <p:cNvSpPr txBox="1"/>
+          <p:nvPr/>
+        </p:nvSpPr>
+        <p:spPr>
+          <a:xfrm>
+            <a:off x="8893998" y="405716"/>
+            <a:ext cx="2887714" cy="369332"/>
+          </a:xfrm>
+          <a:prstGeom prst="rect">
+            <a:avLst/>
+          </a:prstGeom>
+          <a:noFill/>
+        </p:spPr>
+        <p:txBody>
+          <a:bodyPr wrap="none" rtlCol="0">
+            <a:spAutoFit/>
+          </a:bodyPr>
+          <a:lstStyle/>
+          <a:p>
+            <a:r>
+              <a:rPr lang="en-GB" dirty="0"/>
+              <a:t>Sketch Icons for Cal/Distance</a:t>
+            </a:r>
+            <a:endParaRPr lang="en-US" dirty="0"/>
+          </a:p>
+        </p:txBody>
+      </p:sp>
+      <p:pic>
+        <p:nvPicPr>
+          <p:cNvPr id="31" name="Graphic 30" descr="Shoe footprints with solid fill">
+            <a:extLst>
+              <a:ext uri="{FF2B5EF4-FFF2-40B4-BE49-F238E27FC236}">
+                <a16:creationId xmlns:a16="http://schemas.microsoft.com/office/drawing/2014/main" id="{00A4D71A-0CC9-4039-A53A-44EB69AF5FFA}"/>
+              </a:ext>
+            </a:extLst>
+          </p:cNvPr>
+          <p:cNvPicPr>
+            <a:picLocks noChangeAspect="1"/>
+          </p:cNvPicPr>
+          <p:nvPr/>
+        </p:nvPicPr>
+        <p:blipFill>
+          <a:blip r:embed="rId29">
+            <a:extLst>
+              <a:ext uri="{28A0092B-C50C-407E-A947-70E740481C1C}">
+                <a14:useLocalDpi xmlns:a14="http://schemas.microsoft.com/office/drawing/2010/main" val="0"/>
+              </a:ext>
+              <a:ext uri="{96DAC541-7B7A-43D3-8B79-37D633B846F1}">
+                <asvg:svgBlip xmlns:asvg="http://schemas.microsoft.com/office/drawing/2016/SVG/main" r:embed="rId30"/>
+              </a:ext>
+            </a:extLst>
+          </a:blip>
+          <a:stretch>
+            <a:fillRect/>
+          </a:stretch>
+        </p:blipFill>
+        <p:spPr>
+          <a:xfrm>
+            <a:off x="10020675" y="927917"/>
+            <a:ext cx="230400" cy="230400"/>
+          </a:xfrm>
+          <a:prstGeom prst="rect">
+            <a:avLst/>
+          </a:prstGeom>
+        </p:spPr>
+      </p:pic>
+      <p:pic>
+        <p:nvPicPr>
+          <p:cNvPr id="42" name="Graphic 41" descr="Fire with solid fill">
+            <a:extLst>
+              <a:ext uri="{FF2B5EF4-FFF2-40B4-BE49-F238E27FC236}">
+                <a16:creationId xmlns:a16="http://schemas.microsoft.com/office/drawing/2014/main" id="{2585CFD3-FB98-4925-8FF4-047EB9E2CC7F}"/>
+              </a:ext>
+            </a:extLst>
+          </p:cNvPr>
+          <p:cNvPicPr>
+            <a:picLocks noChangeAspect="1"/>
+          </p:cNvPicPr>
+          <p:nvPr/>
+        </p:nvPicPr>
+        <p:blipFill>
+          <a:blip r:embed="rId31">
+            <a:extLst>
+              <a:ext uri="{28A0092B-C50C-407E-A947-70E740481C1C}">
+                <a14:useLocalDpi xmlns:a14="http://schemas.microsoft.com/office/drawing/2010/main" val="0"/>
+              </a:ext>
+              <a:ext uri="{96DAC541-7B7A-43D3-8B79-37D633B846F1}">
+                <asvg:svgBlip xmlns:asvg="http://schemas.microsoft.com/office/drawing/2016/SVG/main" r:embed="rId32"/>
+              </a:ext>
+            </a:extLst>
+          </a:blip>
+          <a:stretch>
+            <a:fillRect/>
+          </a:stretch>
+        </p:blipFill>
+        <p:spPr>
+          <a:xfrm>
+            <a:off x="10834881" y="927917"/>
+            <a:ext cx="230400" cy="230400"/>
+          </a:xfrm>
+          <a:prstGeom prst="rect">
+            <a:avLst/>
+          </a:prstGeom>
+        </p:spPr>
+      </p:pic>
     </p:spTree>
     <p:extLst>
       <p:ext uri="{BB962C8B-B14F-4D97-AF65-F5344CB8AC3E}">

</xml_diff>

<commit_message>
Interim check in with basics of calories distance steps
</commit_message>
<xml_diff>
--- a/Design/Design.pptx
+++ b/Design/Design.pptx
@@ -259,7 +259,7 @@
           <a:p>
             <a:fld id="{D8774586-24DE-4023-9D0F-653DEE581528}" type="datetimeFigureOut">
               <a:rPr lang="en-US" smtClean="0"/>
-              <a:t>12/13/2020</a:t>
+              <a:t>12/14/2020</a:t>
             </a:fld>
             <a:endParaRPr lang="en-US"/>
           </a:p>
@@ -457,7 +457,7 @@
           <a:p>
             <a:fld id="{D8774586-24DE-4023-9D0F-653DEE581528}" type="datetimeFigureOut">
               <a:rPr lang="en-US" smtClean="0"/>
-              <a:t>12/13/2020</a:t>
+              <a:t>12/14/2020</a:t>
             </a:fld>
             <a:endParaRPr lang="en-US"/>
           </a:p>
@@ -665,7 +665,7 @@
           <a:p>
             <a:fld id="{D8774586-24DE-4023-9D0F-653DEE581528}" type="datetimeFigureOut">
               <a:rPr lang="en-US" smtClean="0"/>
-              <a:t>12/13/2020</a:t>
+              <a:t>12/14/2020</a:t>
             </a:fld>
             <a:endParaRPr lang="en-US"/>
           </a:p>
@@ -863,7 +863,7 @@
           <a:p>
             <a:fld id="{D8774586-24DE-4023-9D0F-653DEE581528}" type="datetimeFigureOut">
               <a:rPr lang="en-US" smtClean="0"/>
-              <a:t>12/13/2020</a:t>
+              <a:t>12/14/2020</a:t>
             </a:fld>
             <a:endParaRPr lang="en-US"/>
           </a:p>
@@ -1138,7 +1138,7 @@
           <a:p>
             <a:fld id="{D8774586-24DE-4023-9D0F-653DEE581528}" type="datetimeFigureOut">
               <a:rPr lang="en-US" smtClean="0"/>
-              <a:t>12/13/2020</a:t>
+              <a:t>12/14/2020</a:t>
             </a:fld>
             <a:endParaRPr lang="en-US"/>
           </a:p>
@@ -1403,7 +1403,7 @@
           <a:p>
             <a:fld id="{D8774586-24DE-4023-9D0F-653DEE581528}" type="datetimeFigureOut">
               <a:rPr lang="en-US" smtClean="0"/>
-              <a:t>12/13/2020</a:t>
+              <a:t>12/14/2020</a:t>
             </a:fld>
             <a:endParaRPr lang="en-US"/>
           </a:p>
@@ -1815,7 +1815,7 @@
           <a:p>
             <a:fld id="{D8774586-24DE-4023-9D0F-653DEE581528}" type="datetimeFigureOut">
               <a:rPr lang="en-US" smtClean="0"/>
-              <a:t>12/13/2020</a:t>
+              <a:t>12/14/2020</a:t>
             </a:fld>
             <a:endParaRPr lang="en-US"/>
           </a:p>
@@ -1956,7 +1956,7 @@
           <a:p>
             <a:fld id="{D8774586-24DE-4023-9D0F-653DEE581528}" type="datetimeFigureOut">
               <a:rPr lang="en-US" smtClean="0"/>
-              <a:t>12/13/2020</a:t>
+              <a:t>12/14/2020</a:t>
             </a:fld>
             <a:endParaRPr lang="en-US"/>
           </a:p>
@@ -2069,7 +2069,7 @@
           <a:p>
             <a:fld id="{D8774586-24DE-4023-9D0F-653DEE581528}" type="datetimeFigureOut">
               <a:rPr lang="en-US" smtClean="0"/>
-              <a:t>12/13/2020</a:t>
+              <a:t>12/14/2020</a:t>
             </a:fld>
             <a:endParaRPr lang="en-US"/>
           </a:p>
@@ -2380,7 +2380,7 @@
           <a:p>
             <a:fld id="{D8774586-24DE-4023-9D0F-653DEE581528}" type="datetimeFigureOut">
               <a:rPr lang="en-US" smtClean="0"/>
-              <a:t>12/13/2020</a:t>
+              <a:t>12/14/2020</a:t>
             </a:fld>
             <a:endParaRPr lang="en-US"/>
           </a:p>
@@ -2668,7 +2668,7 @@
           <a:p>
             <a:fld id="{D8774586-24DE-4023-9D0F-653DEE581528}" type="datetimeFigureOut">
               <a:rPr lang="en-US" smtClean="0"/>
-              <a:t>12/13/2020</a:t>
+              <a:t>12/14/2020</a:t>
             </a:fld>
             <a:endParaRPr lang="en-US"/>
           </a:p>
@@ -2909,7 +2909,7 @@
           <a:p>
             <a:fld id="{D8774586-24DE-4023-9D0F-653DEE581528}" type="datetimeFigureOut">
               <a:rPr lang="en-US" smtClean="0"/>
-              <a:t>12/13/2020</a:t>
+              <a:t>12/14/2020</a:t>
             </a:fld>
             <a:endParaRPr lang="en-US"/>
           </a:p>
@@ -4369,6 +4369,84 @@
           </a:prstGeom>
         </p:spPr>
       </p:pic>
+      <p:pic>
+        <p:nvPicPr>
+          <p:cNvPr id="4" name="Graphic 3" descr="Run with solid fill">
+            <a:extLst>
+              <a:ext uri="{FF2B5EF4-FFF2-40B4-BE49-F238E27FC236}">
+                <a16:creationId xmlns:a16="http://schemas.microsoft.com/office/drawing/2014/main" id="{2727B2F8-39EB-4B88-B173-3288509F5A22}"/>
+              </a:ext>
+            </a:extLst>
+          </p:cNvPr>
+          <p:cNvPicPr>
+            <a:picLocks noChangeAspect="1"/>
+          </p:cNvPicPr>
+          <p:nvPr/>
+        </p:nvPicPr>
+        <p:blipFill>
+          <a:blip r:embed="rId33">
+            <a:extLst>
+              <a:ext uri="{28A0092B-C50C-407E-A947-70E740481C1C}">
+                <a14:useLocalDpi xmlns:a14="http://schemas.microsoft.com/office/drawing/2010/main" val="0"/>
+              </a:ext>
+              <a:ext uri="{96DAC541-7B7A-43D3-8B79-37D633B846F1}">
+                <asvg:svgBlip xmlns:asvg="http://schemas.microsoft.com/office/drawing/2016/SVG/main" r:embed="rId34"/>
+              </a:ext>
+            </a:extLst>
+          </a:blip>
+          <a:stretch>
+            <a:fillRect/>
+          </a:stretch>
+        </p:blipFill>
+        <p:spPr>
+          <a:xfrm>
+            <a:off x="9747209" y="1405013"/>
+            <a:ext cx="230400" cy="230400"/>
+          </a:xfrm>
+          <a:prstGeom prst="rect">
+            <a:avLst/>
+          </a:prstGeom>
+        </p:spPr>
+      </p:pic>
+      <p:pic>
+        <p:nvPicPr>
+          <p:cNvPr id="43" name="Graphic 42" descr="Run with solid fill">
+            <a:extLst>
+              <a:ext uri="{FF2B5EF4-FFF2-40B4-BE49-F238E27FC236}">
+                <a16:creationId xmlns:a16="http://schemas.microsoft.com/office/drawing/2014/main" id="{C5947EA1-F755-49C8-AF7C-F88777FDEFE3}"/>
+              </a:ext>
+            </a:extLst>
+          </p:cNvPr>
+          <p:cNvPicPr>
+            <a:picLocks noChangeAspect="1"/>
+          </p:cNvPicPr>
+          <p:nvPr/>
+        </p:nvPicPr>
+        <p:blipFill>
+          <a:blip r:embed="rId35">
+            <a:extLst>
+              <a:ext uri="{28A0092B-C50C-407E-A947-70E740481C1C}">
+                <a14:useLocalDpi xmlns:a14="http://schemas.microsoft.com/office/drawing/2010/main" val="0"/>
+              </a:ext>
+              <a:ext uri="{96DAC541-7B7A-43D3-8B79-37D633B846F1}">
+                <asvg:svgBlip xmlns:asvg="http://schemas.microsoft.com/office/drawing/2016/SVG/main" r:embed="rId36"/>
+              </a:ext>
+            </a:extLst>
+          </a:blip>
+          <a:stretch>
+            <a:fillRect/>
+          </a:stretch>
+        </p:blipFill>
+        <p:spPr>
+          <a:xfrm>
+            <a:off x="10135875" y="1403079"/>
+            <a:ext cx="230400" cy="230400"/>
+          </a:xfrm>
+          <a:prstGeom prst="rect">
+            <a:avLst/>
+          </a:prstGeom>
+        </p:spPr>
+      </p:pic>
     </p:spTree>
     <p:extLst>
       <p:ext uri="{BB962C8B-B14F-4D97-AF65-F5344CB8AC3E}">

</xml_diff>

<commit_message>
Working with options around calories etc cycling display
</commit_message>
<xml_diff>
--- a/Design/Design.pptx
+++ b/Design/Design.pptx
@@ -4209,7 +4209,7 @@
         <p:spPr>
           <a:xfrm>
             <a:off x="9747209" y="930323"/>
-            <a:ext cx="230400" cy="230400"/>
+            <a:ext cx="190500" cy="190500"/>
           </a:xfrm>
           <a:prstGeom prst="rect">
             <a:avLst/>
@@ -4248,7 +4248,7 @@
         <p:spPr>
           <a:xfrm>
             <a:off x="10524542" y="930323"/>
-            <a:ext cx="230400" cy="230400"/>
+            <a:ext cx="190500" cy="190500"/>
           </a:xfrm>
           <a:prstGeom prst="rect">
             <a:avLst/>
@@ -4323,7 +4323,7 @@
         <p:spPr>
           <a:xfrm>
             <a:off x="10020675" y="927917"/>
-            <a:ext cx="230400" cy="230400"/>
+            <a:ext cx="190500" cy="190500"/>
           </a:xfrm>
           <a:prstGeom prst="rect">
             <a:avLst/>
@@ -4362,7 +4362,7 @@
         <p:spPr>
           <a:xfrm>
             <a:off x="10834881" y="927917"/>
-            <a:ext cx="230400" cy="230400"/>
+            <a:ext cx="190500" cy="190500"/>
           </a:xfrm>
           <a:prstGeom prst="rect">
             <a:avLst/>
@@ -4401,7 +4401,7 @@
         <p:spPr>
           <a:xfrm>
             <a:off x="9747209" y="1405013"/>
-            <a:ext cx="230400" cy="230400"/>
+            <a:ext cx="190500" cy="190500"/>
           </a:xfrm>
           <a:prstGeom prst="rect">
             <a:avLst/>
@@ -4440,7 +4440,46 @@
         <p:spPr>
           <a:xfrm>
             <a:off x="10135875" y="1403079"/>
-            <a:ext cx="230400" cy="230400"/>
+            <a:ext cx="190500" cy="190500"/>
+          </a:xfrm>
+          <a:prstGeom prst="rect">
+            <a:avLst/>
+          </a:prstGeom>
+        </p:spPr>
+      </p:pic>
+      <p:pic>
+        <p:nvPicPr>
+          <p:cNvPr id="45" name="Graphic 44" descr="Shoe footprints with solid fill">
+            <a:extLst>
+              <a:ext uri="{FF2B5EF4-FFF2-40B4-BE49-F238E27FC236}">
+                <a16:creationId xmlns:a16="http://schemas.microsoft.com/office/drawing/2014/main" id="{BC8F60A6-13D3-4966-B77C-215C9C6C27D5}"/>
+              </a:ext>
+            </a:extLst>
+          </p:cNvPr>
+          <p:cNvPicPr>
+            <a:picLocks noChangeAspect="1"/>
+          </p:cNvPicPr>
+          <p:nvPr/>
+        </p:nvPicPr>
+        <p:blipFill>
+          <a:blip r:embed="rId37">
+            <a:extLst>
+              <a:ext uri="{28A0092B-C50C-407E-A947-70E740481C1C}">
+                <a14:useLocalDpi xmlns:a14="http://schemas.microsoft.com/office/drawing/2010/main" val="0"/>
+              </a:ext>
+              <a:ext uri="{96DAC541-7B7A-43D3-8B79-37D633B846F1}">
+                <asvg:svgBlip xmlns:asvg="http://schemas.microsoft.com/office/drawing/2016/SVG/main" r:embed="rId38"/>
+              </a:ext>
+            </a:extLst>
+          </a:blip>
+          <a:stretch>
+            <a:fillRect/>
+          </a:stretch>
+        </p:blipFill>
+        <p:spPr>
+          <a:xfrm>
+            <a:off x="9473347" y="900229"/>
+            <a:ext cx="190500" cy="190500"/>
           </a:xfrm>
           <a:prstGeom prst="rect">
             <a:avLst/>

</xml_diff>

<commit_message>
Modified battery poor icon
</commit_message>
<xml_diff>
--- a/Design/Design.pptx
+++ b/Design/Design.pptx
@@ -259,7 +259,7 @@
           <a:p>
             <a:fld id="{D8774586-24DE-4023-9D0F-653DEE581528}" type="datetimeFigureOut">
               <a:rPr lang="en-US" smtClean="0"/>
-              <a:t>12/14/2020</a:t>
+              <a:t>12/15/2020</a:t>
             </a:fld>
             <a:endParaRPr lang="en-US"/>
           </a:p>
@@ -457,7 +457,7 @@
           <a:p>
             <a:fld id="{D8774586-24DE-4023-9D0F-653DEE581528}" type="datetimeFigureOut">
               <a:rPr lang="en-US" smtClean="0"/>
-              <a:t>12/14/2020</a:t>
+              <a:t>12/15/2020</a:t>
             </a:fld>
             <a:endParaRPr lang="en-US"/>
           </a:p>
@@ -665,7 +665,7 @@
           <a:p>
             <a:fld id="{D8774586-24DE-4023-9D0F-653DEE581528}" type="datetimeFigureOut">
               <a:rPr lang="en-US" smtClean="0"/>
-              <a:t>12/14/2020</a:t>
+              <a:t>12/15/2020</a:t>
             </a:fld>
             <a:endParaRPr lang="en-US"/>
           </a:p>
@@ -863,7 +863,7 @@
           <a:p>
             <a:fld id="{D8774586-24DE-4023-9D0F-653DEE581528}" type="datetimeFigureOut">
               <a:rPr lang="en-US" smtClean="0"/>
-              <a:t>12/14/2020</a:t>
+              <a:t>12/15/2020</a:t>
             </a:fld>
             <a:endParaRPr lang="en-US"/>
           </a:p>
@@ -1138,7 +1138,7 @@
           <a:p>
             <a:fld id="{D8774586-24DE-4023-9D0F-653DEE581528}" type="datetimeFigureOut">
               <a:rPr lang="en-US" smtClean="0"/>
-              <a:t>12/14/2020</a:t>
+              <a:t>12/15/2020</a:t>
             </a:fld>
             <a:endParaRPr lang="en-US"/>
           </a:p>
@@ -1403,7 +1403,7 @@
           <a:p>
             <a:fld id="{D8774586-24DE-4023-9D0F-653DEE581528}" type="datetimeFigureOut">
               <a:rPr lang="en-US" smtClean="0"/>
-              <a:t>12/14/2020</a:t>
+              <a:t>12/15/2020</a:t>
             </a:fld>
             <a:endParaRPr lang="en-US"/>
           </a:p>
@@ -1815,7 +1815,7 @@
           <a:p>
             <a:fld id="{D8774586-24DE-4023-9D0F-653DEE581528}" type="datetimeFigureOut">
               <a:rPr lang="en-US" smtClean="0"/>
-              <a:t>12/14/2020</a:t>
+              <a:t>12/15/2020</a:t>
             </a:fld>
             <a:endParaRPr lang="en-US"/>
           </a:p>
@@ -1956,7 +1956,7 @@
           <a:p>
             <a:fld id="{D8774586-24DE-4023-9D0F-653DEE581528}" type="datetimeFigureOut">
               <a:rPr lang="en-US" smtClean="0"/>
-              <a:t>12/14/2020</a:t>
+              <a:t>12/15/2020</a:t>
             </a:fld>
             <a:endParaRPr lang="en-US"/>
           </a:p>
@@ -2069,7 +2069,7 @@
           <a:p>
             <a:fld id="{D8774586-24DE-4023-9D0F-653DEE581528}" type="datetimeFigureOut">
               <a:rPr lang="en-US" smtClean="0"/>
-              <a:t>12/14/2020</a:t>
+              <a:t>12/15/2020</a:t>
             </a:fld>
             <a:endParaRPr lang="en-US"/>
           </a:p>
@@ -2380,7 +2380,7 @@
           <a:p>
             <a:fld id="{D8774586-24DE-4023-9D0F-653DEE581528}" type="datetimeFigureOut">
               <a:rPr lang="en-US" smtClean="0"/>
-              <a:t>12/14/2020</a:t>
+              <a:t>12/15/2020</a:t>
             </a:fld>
             <a:endParaRPr lang="en-US"/>
           </a:p>
@@ -2668,7 +2668,7 @@
           <a:p>
             <a:fld id="{D8774586-24DE-4023-9D0F-653DEE581528}" type="datetimeFigureOut">
               <a:rPr lang="en-US" smtClean="0"/>
-              <a:t>12/14/2020</a:t>
+              <a:t>12/15/2020</a:t>
             </a:fld>
             <a:endParaRPr lang="en-US"/>
           </a:p>
@@ -2909,7 +2909,7 @@
           <a:p>
             <a:fld id="{D8774586-24DE-4023-9D0F-653DEE581528}" type="datetimeFigureOut">
               <a:rPr lang="en-US" smtClean="0"/>
-              <a:t>12/14/2020</a:t>
+              <a:t>12/15/2020</a:t>
             </a:fld>
             <a:endParaRPr lang="en-US"/>
           </a:p>
@@ -4486,6 +4486,45 @@
           </a:prstGeom>
         </p:spPr>
       </p:pic>
+      <p:pic>
+        <p:nvPicPr>
+          <p:cNvPr id="44" name="Graphic 43" descr="Full battery with solid fill">
+            <a:extLst>
+              <a:ext uri="{FF2B5EF4-FFF2-40B4-BE49-F238E27FC236}">
+                <a16:creationId xmlns:a16="http://schemas.microsoft.com/office/drawing/2014/main" id="{90A3AD24-DEF8-4C5D-88BD-C9E170A09D50}"/>
+              </a:ext>
+            </a:extLst>
+          </p:cNvPr>
+          <p:cNvPicPr>
+            <a:picLocks noChangeAspect="1"/>
+          </p:cNvPicPr>
+          <p:nvPr/>
+        </p:nvPicPr>
+        <p:blipFill>
+          <a:blip r:embed="rId39">
+            <a:extLst>
+              <a:ext uri="{28A0092B-C50C-407E-A947-70E740481C1C}">
+                <a14:useLocalDpi xmlns:a14="http://schemas.microsoft.com/office/drawing/2010/main" val="0"/>
+              </a:ext>
+              <a:ext uri="{96DAC541-7B7A-43D3-8B79-37D633B846F1}">
+                <asvg:svgBlip xmlns:asvg="http://schemas.microsoft.com/office/drawing/2016/SVG/main" r:embed="rId40"/>
+              </a:ext>
+            </a:extLst>
+          </a:blip>
+          <a:stretch>
+            <a:fillRect/>
+          </a:stretch>
+        </p:blipFill>
+        <p:spPr>
+          <a:xfrm>
+            <a:off x="7194772" y="3428999"/>
+            <a:ext cx="342900" cy="342900"/>
+          </a:xfrm>
+          <a:prstGeom prst="rect">
+            <a:avLst/>
+          </a:prstGeom>
+        </p:spPr>
+      </p:pic>
     </p:spTree>
     <p:extLst>
       <p:ext uri="{BB962C8B-B14F-4D97-AF65-F5344CB8AC3E}">

</xml_diff>

<commit_message>
Ability to change heart colour
</commit_message>
<xml_diff>
--- a/Design/Design.pptx
+++ b/Design/Design.pptx
@@ -259,7 +259,7 @@
           <a:p>
             <a:fld id="{D8774586-24DE-4023-9D0F-653DEE581528}" type="datetimeFigureOut">
               <a:rPr lang="en-US" smtClean="0"/>
-              <a:t>12/15/2020</a:t>
+              <a:t>12/18/2020</a:t>
             </a:fld>
             <a:endParaRPr lang="en-US"/>
           </a:p>
@@ -457,7 +457,7 @@
           <a:p>
             <a:fld id="{D8774586-24DE-4023-9D0F-653DEE581528}" type="datetimeFigureOut">
               <a:rPr lang="en-US" smtClean="0"/>
-              <a:t>12/15/2020</a:t>
+              <a:t>12/18/2020</a:t>
             </a:fld>
             <a:endParaRPr lang="en-US"/>
           </a:p>
@@ -665,7 +665,7 @@
           <a:p>
             <a:fld id="{D8774586-24DE-4023-9D0F-653DEE581528}" type="datetimeFigureOut">
               <a:rPr lang="en-US" smtClean="0"/>
-              <a:t>12/15/2020</a:t>
+              <a:t>12/18/2020</a:t>
             </a:fld>
             <a:endParaRPr lang="en-US"/>
           </a:p>
@@ -863,7 +863,7 @@
           <a:p>
             <a:fld id="{D8774586-24DE-4023-9D0F-653DEE581528}" type="datetimeFigureOut">
               <a:rPr lang="en-US" smtClean="0"/>
-              <a:t>12/15/2020</a:t>
+              <a:t>12/18/2020</a:t>
             </a:fld>
             <a:endParaRPr lang="en-US"/>
           </a:p>
@@ -1138,7 +1138,7 @@
           <a:p>
             <a:fld id="{D8774586-24DE-4023-9D0F-653DEE581528}" type="datetimeFigureOut">
               <a:rPr lang="en-US" smtClean="0"/>
-              <a:t>12/15/2020</a:t>
+              <a:t>12/18/2020</a:t>
             </a:fld>
             <a:endParaRPr lang="en-US"/>
           </a:p>
@@ -1403,7 +1403,7 @@
           <a:p>
             <a:fld id="{D8774586-24DE-4023-9D0F-653DEE581528}" type="datetimeFigureOut">
               <a:rPr lang="en-US" smtClean="0"/>
-              <a:t>12/15/2020</a:t>
+              <a:t>12/18/2020</a:t>
             </a:fld>
             <a:endParaRPr lang="en-US"/>
           </a:p>
@@ -1815,7 +1815,7 @@
           <a:p>
             <a:fld id="{D8774586-24DE-4023-9D0F-653DEE581528}" type="datetimeFigureOut">
               <a:rPr lang="en-US" smtClean="0"/>
-              <a:t>12/15/2020</a:t>
+              <a:t>12/18/2020</a:t>
             </a:fld>
             <a:endParaRPr lang="en-US"/>
           </a:p>
@@ -1956,7 +1956,7 @@
           <a:p>
             <a:fld id="{D8774586-24DE-4023-9D0F-653DEE581528}" type="datetimeFigureOut">
               <a:rPr lang="en-US" smtClean="0"/>
-              <a:t>12/15/2020</a:t>
+              <a:t>12/18/2020</a:t>
             </a:fld>
             <a:endParaRPr lang="en-US"/>
           </a:p>
@@ -2069,7 +2069,7 @@
           <a:p>
             <a:fld id="{D8774586-24DE-4023-9D0F-653DEE581528}" type="datetimeFigureOut">
               <a:rPr lang="en-US" smtClean="0"/>
-              <a:t>12/15/2020</a:t>
+              <a:t>12/18/2020</a:t>
             </a:fld>
             <a:endParaRPr lang="en-US"/>
           </a:p>
@@ -2380,7 +2380,7 @@
           <a:p>
             <a:fld id="{D8774586-24DE-4023-9D0F-653DEE581528}" type="datetimeFigureOut">
               <a:rPr lang="en-US" smtClean="0"/>
-              <a:t>12/15/2020</a:t>
+              <a:t>12/18/2020</a:t>
             </a:fld>
             <a:endParaRPr lang="en-US"/>
           </a:p>
@@ -2668,7 +2668,7 @@
           <a:p>
             <a:fld id="{D8774586-24DE-4023-9D0F-653DEE581528}" type="datetimeFigureOut">
               <a:rPr lang="en-US" smtClean="0"/>
-              <a:t>12/15/2020</a:t>
+              <a:t>12/18/2020</a:t>
             </a:fld>
             <a:endParaRPr lang="en-US"/>
           </a:p>
@@ -2909,7 +2909,7 @@
           <a:p>
             <a:fld id="{D8774586-24DE-4023-9D0F-653DEE581528}" type="datetimeFigureOut">
               <a:rPr lang="en-US" smtClean="0"/>
-              <a:t>12/15/2020</a:t>
+              <a:t>12/18/2020</a:t>
             </a:fld>
             <a:endParaRPr lang="en-US"/>
           </a:p>
@@ -4525,6 +4525,240 @@
           </a:prstGeom>
         </p:spPr>
       </p:pic>
+      <p:pic>
+        <p:nvPicPr>
+          <p:cNvPr id="46" name="Graphic 45" descr="Heart with solid fill">
+            <a:extLst>
+              <a:ext uri="{FF2B5EF4-FFF2-40B4-BE49-F238E27FC236}">
+                <a16:creationId xmlns:a16="http://schemas.microsoft.com/office/drawing/2014/main" id="{CF3A83A7-E76D-4350-9C1D-251722A133F5}"/>
+              </a:ext>
+            </a:extLst>
+          </p:cNvPr>
+          <p:cNvPicPr>
+            <a:picLocks noChangeAspect="1"/>
+          </p:cNvPicPr>
+          <p:nvPr/>
+        </p:nvPicPr>
+        <p:blipFill>
+          <a:blip r:embed="rId41">
+            <a:extLst>
+              <a:ext uri="{28A0092B-C50C-407E-A947-70E740481C1C}">
+                <a14:useLocalDpi xmlns:a14="http://schemas.microsoft.com/office/drawing/2010/main" val="0"/>
+              </a:ext>
+              <a:ext uri="{96DAC541-7B7A-43D3-8B79-37D633B846F1}">
+                <asvg:svgBlip xmlns:asvg="http://schemas.microsoft.com/office/drawing/2016/SVG/main" r:embed="rId42"/>
+              </a:ext>
+            </a:extLst>
+          </a:blip>
+          <a:stretch>
+            <a:fillRect/>
+          </a:stretch>
+        </p:blipFill>
+        <p:spPr>
+          <a:xfrm>
+            <a:off x="5001268" y="5860978"/>
+            <a:ext cx="914400" cy="914400"/>
+          </a:xfrm>
+          <a:prstGeom prst="rect">
+            <a:avLst/>
+          </a:prstGeom>
+        </p:spPr>
+      </p:pic>
+      <p:pic>
+        <p:nvPicPr>
+          <p:cNvPr id="47" name="Graphic 46" descr="Heart with solid fill">
+            <a:extLst>
+              <a:ext uri="{FF2B5EF4-FFF2-40B4-BE49-F238E27FC236}">
+                <a16:creationId xmlns:a16="http://schemas.microsoft.com/office/drawing/2014/main" id="{36B82928-AA51-4A81-8E32-C532B4EF03E3}"/>
+              </a:ext>
+            </a:extLst>
+          </p:cNvPr>
+          <p:cNvPicPr>
+            <a:picLocks noChangeAspect="1"/>
+          </p:cNvPicPr>
+          <p:nvPr/>
+        </p:nvPicPr>
+        <p:blipFill>
+          <a:blip r:embed="rId43">
+            <a:extLst>
+              <a:ext uri="{28A0092B-C50C-407E-A947-70E740481C1C}">
+                <a14:useLocalDpi xmlns:a14="http://schemas.microsoft.com/office/drawing/2010/main" val="0"/>
+              </a:ext>
+              <a:ext uri="{96DAC541-7B7A-43D3-8B79-37D633B846F1}">
+                <asvg:svgBlip xmlns:asvg="http://schemas.microsoft.com/office/drawing/2016/SVG/main" r:embed="rId44"/>
+              </a:ext>
+            </a:extLst>
+          </a:blip>
+          <a:stretch>
+            <a:fillRect/>
+          </a:stretch>
+        </p:blipFill>
+        <p:spPr>
+          <a:xfrm>
+            <a:off x="5745850" y="5860978"/>
+            <a:ext cx="914400" cy="914400"/>
+          </a:xfrm>
+          <a:prstGeom prst="rect">
+            <a:avLst/>
+          </a:prstGeom>
+        </p:spPr>
+      </p:pic>
+      <p:pic>
+        <p:nvPicPr>
+          <p:cNvPr id="48" name="Graphic 47" descr="Heart with solid fill">
+            <a:extLst>
+              <a:ext uri="{FF2B5EF4-FFF2-40B4-BE49-F238E27FC236}">
+                <a16:creationId xmlns:a16="http://schemas.microsoft.com/office/drawing/2014/main" id="{67438D0A-539D-4B05-99B8-61466443012D}"/>
+              </a:ext>
+            </a:extLst>
+          </p:cNvPr>
+          <p:cNvPicPr>
+            <a:picLocks noChangeAspect="1"/>
+          </p:cNvPicPr>
+          <p:nvPr/>
+        </p:nvPicPr>
+        <p:blipFill>
+          <a:blip r:embed="rId45">
+            <a:extLst>
+              <a:ext uri="{28A0092B-C50C-407E-A947-70E740481C1C}">
+                <a14:useLocalDpi xmlns:a14="http://schemas.microsoft.com/office/drawing/2010/main" val="0"/>
+              </a:ext>
+              <a:ext uri="{96DAC541-7B7A-43D3-8B79-37D633B846F1}">
+                <asvg:svgBlip xmlns:asvg="http://schemas.microsoft.com/office/drawing/2016/SVG/main" r:embed="rId46"/>
+              </a:ext>
+            </a:extLst>
+          </a:blip>
+          <a:stretch>
+            <a:fillRect/>
+          </a:stretch>
+        </p:blipFill>
+        <p:spPr>
+          <a:xfrm>
+            <a:off x="6490432" y="5860978"/>
+            <a:ext cx="914400" cy="914400"/>
+          </a:xfrm>
+          <a:prstGeom prst="rect">
+            <a:avLst/>
+          </a:prstGeom>
+        </p:spPr>
+      </p:pic>
+      <p:pic>
+        <p:nvPicPr>
+          <p:cNvPr id="49" name="Graphic 48" descr="Heart with solid fill">
+            <a:extLst>
+              <a:ext uri="{FF2B5EF4-FFF2-40B4-BE49-F238E27FC236}">
+                <a16:creationId xmlns:a16="http://schemas.microsoft.com/office/drawing/2014/main" id="{2B1F39D5-64C5-4AD7-B391-14A84C67F888}"/>
+              </a:ext>
+            </a:extLst>
+          </p:cNvPr>
+          <p:cNvPicPr>
+            <a:picLocks noChangeAspect="1"/>
+          </p:cNvPicPr>
+          <p:nvPr/>
+        </p:nvPicPr>
+        <p:blipFill>
+          <a:blip r:embed="rId47">
+            <a:extLst>
+              <a:ext uri="{28A0092B-C50C-407E-A947-70E740481C1C}">
+                <a14:useLocalDpi xmlns:a14="http://schemas.microsoft.com/office/drawing/2010/main" val="0"/>
+              </a:ext>
+              <a:ext uri="{96DAC541-7B7A-43D3-8B79-37D633B846F1}">
+                <asvg:svgBlip xmlns:asvg="http://schemas.microsoft.com/office/drawing/2016/SVG/main" r:embed="rId48"/>
+              </a:ext>
+            </a:extLst>
+          </a:blip>
+          <a:stretch>
+            <a:fillRect/>
+          </a:stretch>
+        </p:blipFill>
+        <p:spPr>
+          <a:xfrm>
+            <a:off x="7235014" y="5860978"/>
+            <a:ext cx="914400" cy="914400"/>
+          </a:xfrm>
+          <a:prstGeom prst="rect">
+            <a:avLst/>
+          </a:prstGeom>
+        </p:spPr>
+      </p:pic>
+      <p:pic>
+        <p:nvPicPr>
+          <p:cNvPr id="50" name="Graphic 49" descr="Heart with solid fill">
+            <a:extLst>
+              <a:ext uri="{FF2B5EF4-FFF2-40B4-BE49-F238E27FC236}">
+                <a16:creationId xmlns:a16="http://schemas.microsoft.com/office/drawing/2014/main" id="{DB04FE7E-72C4-47EE-B835-1AFE9F2033E0}"/>
+              </a:ext>
+            </a:extLst>
+          </p:cNvPr>
+          <p:cNvPicPr>
+            <a:picLocks noChangeAspect="1"/>
+          </p:cNvPicPr>
+          <p:nvPr/>
+        </p:nvPicPr>
+        <p:blipFill>
+          <a:blip r:embed="rId49">
+            <a:extLst>
+              <a:ext uri="{28A0092B-C50C-407E-A947-70E740481C1C}">
+                <a14:useLocalDpi xmlns:a14="http://schemas.microsoft.com/office/drawing/2010/main" val="0"/>
+              </a:ext>
+              <a:ext uri="{96DAC541-7B7A-43D3-8B79-37D633B846F1}">
+                <asvg:svgBlip xmlns:asvg="http://schemas.microsoft.com/office/drawing/2016/SVG/main" r:embed="rId50"/>
+              </a:ext>
+            </a:extLst>
+          </a:blip>
+          <a:stretch>
+            <a:fillRect/>
+          </a:stretch>
+        </p:blipFill>
+        <p:spPr>
+          <a:xfrm>
+            <a:off x="7979598" y="5860978"/>
+            <a:ext cx="914400" cy="914400"/>
+          </a:xfrm>
+          <a:prstGeom prst="rect">
+            <a:avLst/>
+          </a:prstGeom>
+        </p:spPr>
+      </p:pic>
+      <p:pic>
+        <p:nvPicPr>
+          <p:cNvPr id="51" name="Graphic 50" descr="Heart with solid fill">
+            <a:extLst>
+              <a:ext uri="{FF2B5EF4-FFF2-40B4-BE49-F238E27FC236}">
+                <a16:creationId xmlns:a16="http://schemas.microsoft.com/office/drawing/2014/main" id="{A1832435-CF4A-4613-A3F2-093735CFECD0}"/>
+              </a:ext>
+            </a:extLst>
+          </p:cNvPr>
+          <p:cNvPicPr>
+            <a:picLocks noChangeAspect="1"/>
+          </p:cNvPicPr>
+          <p:nvPr/>
+        </p:nvPicPr>
+        <p:blipFill>
+          <a:blip r:embed="rId51">
+            <a:extLst>
+              <a:ext uri="{28A0092B-C50C-407E-A947-70E740481C1C}">
+                <a14:useLocalDpi xmlns:a14="http://schemas.microsoft.com/office/drawing/2010/main" val="0"/>
+              </a:ext>
+              <a:ext uri="{96DAC541-7B7A-43D3-8B79-37D633B846F1}">
+                <asvg:svgBlip xmlns:asvg="http://schemas.microsoft.com/office/drawing/2016/SVG/main" r:embed="rId52"/>
+              </a:ext>
+            </a:extLst>
+          </a:blip>
+          <a:stretch>
+            <a:fillRect/>
+          </a:stretch>
+        </p:blipFill>
+        <p:spPr>
+          <a:xfrm>
+            <a:off x="4256686" y="5860978"/>
+            <a:ext cx="914400" cy="914400"/>
+          </a:xfrm>
+          <a:prstGeom prst="rect">
+            <a:avLst/>
+          </a:prstGeom>
+        </p:spPr>
+      </p:pic>
     </p:spTree>
     <p:extLst>
       <p:ext uri="{BB962C8B-B14F-4D97-AF65-F5344CB8AC3E}">

</xml_diff>